<commit_message>
docu of example 06
</commit_message>
<xml_diff>
--- a/06_light_groups/media/Blender Light Definition.pptx
+++ b/06_light_groups/media/Blender Light Definition.pptx
@@ -7,6 +7,7 @@
   <p:sldIdLst>
     <p:sldId id="256" r:id="rId2"/>
     <p:sldId id="257" r:id="rId3"/>
+    <p:sldId id="258" r:id="rId4"/>
   </p:sldIdLst>
   <p:sldSz cx="19392900" cy="6858000"/>
   <p:notesSz cx="6858000" cy="9144000"/>
@@ -3767,34 +3768,6 @@
           <a:chExt cx="0" cy="0"/>
         </a:xfrm>
       </p:grpSpPr>
-      <p:sp>
-        <p:nvSpPr>
-          <p:cNvPr id="2" name="Title 1">
-            <a:extLst>
-              <a:ext uri="{FF2B5EF4-FFF2-40B4-BE49-F238E27FC236}">
-                <a16:creationId xmlns:a16="http://schemas.microsoft.com/office/drawing/2014/main" id="{B75CEF3B-95E2-431C-8DCE-5964AF5EFBA2}"/>
-              </a:ext>
-            </a:extLst>
-          </p:cNvPr>
-          <p:cNvSpPr>
-            <a:spLocks noGrp="1"/>
-          </p:cNvSpPr>
-          <p:nvPr>
-            <p:ph type="title"/>
-          </p:nvPr>
-        </p:nvSpPr>
-        <p:spPr/>
-        <p:txBody>
-          <a:bodyPr/>
-          <a:lstStyle/>
-          <a:p>
-            <a:r>
-              <a:rPr lang="en-US" dirty="0"/>
-              <a:t>Linking mesh to light with scene structure</a:t>
-            </a:r>
-          </a:p>
-        </p:txBody>
-      </p:sp>
       <p:pic>
         <p:nvPicPr>
           <p:cNvPr id="4" name="Picture 3">
@@ -3817,7 +3790,7 @@
         </p:blipFill>
         <p:spPr>
           <a:xfrm>
-            <a:off x="1133204" y="2025514"/>
+            <a:off x="657215" y="1825098"/>
             <a:ext cx="4040045" cy="3717834"/>
           </a:xfrm>
           <a:prstGeom prst="rect">
@@ -3825,10 +3798,630 @@
           </a:prstGeom>
         </p:spPr>
       </p:pic>
+      <p:sp>
+        <p:nvSpPr>
+          <p:cNvPr id="5" name="Oval 4">
+            <a:extLst>
+              <a:ext uri="{FF2B5EF4-FFF2-40B4-BE49-F238E27FC236}">
+                <a16:creationId xmlns:a16="http://schemas.microsoft.com/office/drawing/2014/main" id="{FB9BEE1B-F47F-413B-A3B6-116C896F09BA}"/>
+              </a:ext>
+            </a:extLst>
+          </p:cNvPr>
+          <p:cNvSpPr/>
+          <p:nvPr/>
+        </p:nvSpPr>
+        <p:spPr>
+          <a:xfrm>
+            <a:off x="5453312" y="1190576"/>
+            <a:ext cx="1886940" cy="727649"/>
+          </a:xfrm>
+          <a:prstGeom prst="ellipse">
+            <a:avLst/>
+          </a:prstGeom>
+          <a:solidFill>
+            <a:srgbClr val="109677"/>
+          </a:solidFill>
+          <a:ln>
+            <a:noFill/>
+          </a:ln>
+        </p:spPr>
+        <p:style>
+          <a:lnRef idx="2">
+            <a:schemeClr val="accent1">
+              <a:shade val="50000"/>
+            </a:schemeClr>
+          </a:lnRef>
+          <a:fillRef idx="1">
+            <a:schemeClr val="accent1"/>
+          </a:fillRef>
+          <a:effectRef idx="0">
+            <a:schemeClr val="accent1"/>
+          </a:effectRef>
+          <a:fontRef idx="minor">
+            <a:schemeClr val="lt1"/>
+          </a:fontRef>
+        </p:style>
+        <p:txBody>
+          <a:bodyPr rtlCol="0" anchor="ctr"/>
+          <a:lstStyle/>
+          <a:p>
+            <a:pPr algn="ctr"/>
+            <a:r>
+              <a:rPr lang="en-US" dirty="0">
+                <a:solidFill>
+                  <a:schemeClr val="tx1"/>
+                </a:solidFill>
+              </a:rPr>
+              <a:t>group name</a:t>
+            </a:r>
+          </a:p>
+        </p:txBody>
+      </p:sp>
+      <p:cxnSp>
+        <p:nvCxnSpPr>
+          <p:cNvPr id="6" name="Straight Arrow Connector 5">
+            <a:extLst>
+              <a:ext uri="{FF2B5EF4-FFF2-40B4-BE49-F238E27FC236}">
+                <a16:creationId xmlns:a16="http://schemas.microsoft.com/office/drawing/2014/main" id="{820BBD42-57ED-4AA0-B8CA-3577DD24C564}"/>
+              </a:ext>
+            </a:extLst>
+          </p:cNvPr>
+          <p:cNvCxnSpPr>
+            <a:cxnSpLocks/>
+          </p:cNvCxnSpPr>
+          <p:nvPr/>
+        </p:nvCxnSpPr>
+        <p:spPr>
+          <a:xfrm flipH="1">
+            <a:off x="3750824" y="1825098"/>
+            <a:ext cx="1610317" cy="529795"/>
+          </a:xfrm>
+          <a:prstGeom prst="straightConnector1">
+            <a:avLst/>
+          </a:prstGeom>
+          <a:ln w="50800">
+            <a:solidFill>
+              <a:srgbClr val="109677"/>
+            </a:solidFill>
+            <a:tailEnd type="arrow"/>
+          </a:ln>
+        </p:spPr>
+        <p:style>
+          <a:lnRef idx="1">
+            <a:schemeClr val="accent6"/>
+          </a:lnRef>
+          <a:fillRef idx="0">
+            <a:schemeClr val="accent6"/>
+          </a:fillRef>
+          <a:effectRef idx="0">
+            <a:schemeClr val="accent6"/>
+          </a:effectRef>
+          <a:fontRef idx="minor">
+            <a:schemeClr val="tx1"/>
+          </a:fontRef>
+        </p:style>
+      </p:cxnSp>
+      <p:pic>
+        <p:nvPicPr>
+          <p:cNvPr id="3" name="Picture 2">
+            <a:extLst>
+              <a:ext uri="{FF2B5EF4-FFF2-40B4-BE49-F238E27FC236}">
+                <a16:creationId xmlns:a16="http://schemas.microsoft.com/office/drawing/2014/main" id="{EEC312B2-C35D-4231-8578-5348C6DD8E1E}"/>
+              </a:ext>
+            </a:extLst>
+          </p:cNvPr>
+          <p:cNvPicPr>
+            <a:picLocks noChangeAspect="1"/>
+          </p:cNvPicPr>
+          <p:nvPr/>
+        </p:nvPicPr>
+        <p:blipFill>
+          <a:blip r:embed="rId3"/>
+          <a:stretch>
+            <a:fillRect/>
+          </a:stretch>
+        </p:blipFill>
+        <p:spPr>
+          <a:xfrm>
+            <a:off x="6396782" y="2256478"/>
+            <a:ext cx="6516501" cy="973293"/>
+          </a:xfrm>
+          <a:prstGeom prst="rect">
+            <a:avLst/>
+          </a:prstGeom>
+        </p:spPr>
+      </p:pic>
+      <p:cxnSp>
+        <p:nvCxnSpPr>
+          <p:cNvPr id="7" name="Straight Arrow Connector 6">
+            <a:extLst>
+              <a:ext uri="{FF2B5EF4-FFF2-40B4-BE49-F238E27FC236}">
+                <a16:creationId xmlns:a16="http://schemas.microsoft.com/office/drawing/2014/main" id="{66F63E8F-E7C6-4F3A-A691-F314E89DB779}"/>
+              </a:ext>
+            </a:extLst>
+          </p:cNvPr>
+          <p:cNvCxnSpPr>
+            <a:cxnSpLocks/>
+          </p:cNvCxnSpPr>
+          <p:nvPr/>
+        </p:nvCxnSpPr>
+        <p:spPr>
+          <a:xfrm>
+            <a:off x="3750824" y="2502743"/>
+            <a:ext cx="2512190" cy="0"/>
+          </a:xfrm>
+          <a:prstGeom prst="straightConnector1">
+            <a:avLst/>
+          </a:prstGeom>
+          <a:ln w="50800">
+            <a:solidFill>
+              <a:srgbClr val="109677"/>
+            </a:solidFill>
+            <a:tailEnd type="arrow"/>
+          </a:ln>
+        </p:spPr>
+        <p:style>
+          <a:lnRef idx="1">
+            <a:schemeClr val="accent6"/>
+          </a:lnRef>
+          <a:fillRef idx="0">
+            <a:schemeClr val="accent6"/>
+          </a:fillRef>
+          <a:effectRef idx="0">
+            <a:schemeClr val="accent6"/>
+          </a:effectRef>
+          <a:fontRef idx="minor">
+            <a:schemeClr val="tx1"/>
+          </a:fontRef>
+        </p:style>
+      </p:cxnSp>
+      <p:cxnSp>
+        <p:nvCxnSpPr>
+          <p:cNvPr id="14" name="Straight Arrow Connector 13">
+            <a:extLst>
+              <a:ext uri="{FF2B5EF4-FFF2-40B4-BE49-F238E27FC236}">
+                <a16:creationId xmlns:a16="http://schemas.microsoft.com/office/drawing/2014/main" id="{6BC2EB3F-BA8D-4866-9CEC-79653CBD9491}"/>
+              </a:ext>
+            </a:extLst>
+          </p:cNvPr>
+          <p:cNvCxnSpPr>
+            <a:cxnSpLocks/>
+          </p:cNvCxnSpPr>
+          <p:nvPr/>
+        </p:nvCxnSpPr>
+        <p:spPr>
+          <a:xfrm>
+            <a:off x="2904460" y="2803863"/>
+            <a:ext cx="3233293" cy="1016575"/>
+          </a:xfrm>
+          <a:prstGeom prst="straightConnector1">
+            <a:avLst/>
+          </a:prstGeom>
+          <a:ln w="50800">
+            <a:solidFill>
+              <a:srgbClr val="109677"/>
+            </a:solidFill>
+            <a:tailEnd type="arrow"/>
+          </a:ln>
+        </p:spPr>
+        <p:style>
+          <a:lnRef idx="1">
+            <a:schemeClr val="accent6"/>
+          </a:lnRef>
+          <a:fillRef idx="0">
+            <a:schemeClr val="accent6"/>
+          </a:fillRef>
+          <a:effectRef idx="0">
+            <a:schemeClr val="accent6"/>
+          </a:effectRef>
+          <a:fontRef idx="minor">
+            <a:schemeClr val="tx1"/>
+          </a:fontRef>
+        </p:style>
+      </p:cxnSp>
+      <p:sp>
+        <p:nvSpPr>
+          <p:cNvPr id="15" name="Oval 14">
+            <a:extLst>
+              <a:ext uri="{FF2B5EF4-FFF2-40B4-BE49-F238E27FC236}">
+                <a16:creationId xmlns:a16="http://schemas.microsoft.com/office/drawing/2014/main" id="{4CF55D09-EF7D-4A39-916E-E5C9DE997A81}"/>
+              </a:ext>
+            </a:extLst>
+          </p:cNvPr>
+          <p:cNvSpPr/>
+          <p:nvPr/>
+        </p:nvSpPr>
+        <p:spPr>
+          <a:xfrm>
+            <a:off x="6197816" y="3568024"/>
+            <a:ext cx="1676510" cy="727649"/>
+          </a:xfrm>
+          <a:prstGeom prst="ellipse">
+            <a:avLst/>
+          </a:prstGeom>
+          <a:solidFill>
+            <a:srgbClr val="109677"/>
+          </a:solidFill>
+          <a:ln>
+            <a:noFill/>
+          </a:ln>
+        </p:spPr>
+        <p:style>
+          <a:lnRef idx="2">
+            <a:schemeClr val="accent1">
+              <a:shade val="50000"/>
+            </a:schemeClr>
+          </a:lnRef>
+          <a:fillRef idx="1">
+            <a:schemeClr val="accent1"/>
+          </a:fillRef>
+          <a:effectRef idx="0">
+            <a:schemeClr val="accent1"/>
+          </a:effectRef>
+          <a:fontRef idx="minor">
+            <a:schemeClr val="lt1"/>
+          </a:fontRef>
+        </p:style>
+        <p:txBody>
+          <a:bodyPr rtlCol="0" anchor="ctr"/>
+          <a:lstStyle/>
+          <a:p>
+            <a:pPr algn="ctr"/>
+            <a:r>
+              <a:rPr lang="en-US" dirty="0">
+                <a:solidFill>
+                  <a:schemeClr val="tx1"/>
+                </a:solidFill>
+              </a:rPr>
+              <a:t>Child Light</a:t>
+            </a:r>
+          </a:p>
+        </p:txBody>
+      </p:sp>
     </p:spTree>
     <p:extLst>
       <p:ext uri="{BB962C8B-B14F-4D97-AF65-F5344CB8AC3E}">
         <p14:creationId xmlns:p14="http://schemas.microsoft.com/office/powerpoint/2010/main" val="2098289775"/>
+      </p:ext>
+    </p:extLst>
+  </p:cSld>
+  <p:clrMapOvr>
+    <a:masterClrMapping/>
+  </p:clrMapOvr>
+</p:sld>
+</file>
+
+<file path=ppt/slides/slide3.xml><?xml version="1.0" encoding="utf-8"?>
+<p:sld xmlns:a="http://schemas.openxmlformats.org/drawingml/2006/main" xmlns:r="http://schemas.openxmlformats.org/officeDocument/2006/relationships" xmlns:p="http://schemas.openxmlformats.org/presentationml/2006/main">
+  <p:cSld>
+    <p:spTree>
+      <p:nvGrpSpPr>
+        <p:cNvPr id="1" name=""/>
+        <p:cNvGrpSpPr/>
+        <p:nvPr/>
+      </p:nvGrpSpPr>
+      <p:grpSpPr>
+        <a:xfrm>
+          <a:off x="0" y="0"/>
+          <a:ext cx="0" cy="0"/>
+          <a:chOff x="0" y="0"/>
+          <a:chExt cx="0" cy="0"/>
+        </a:xfrm>
+      </p:grpSpPr>
+      <p:pic>
+        <p:nvPicPr>
+          <p:cNvPr id="4" name="Picture 3">
+            <a:extLst>
+              <a:ext uri="{FF2B5EF4-FFF2-40B4-BE49-F238E27FC236}">
+                <a16:creationId xmlns:a16="http://schemas.microsoft.com/office/drawing/2014/main" id="{DFA28DC4-C16E-4419-A5C0-C890A3692E14}"/>
+              </a:ext>
+            </a:extLst>
+          </p:cNvPr>
+          <p:cNvPicPr>
+            <a:picLocks noChangeAspect="1"/>
+          </p:cNvPicPr>
+          <p:nvPr/>
+        </p:nvPicPr>
+        <p:blipFill>
+          <a:blip r:embed="rId2"/>
+          <a:stretch>
+            <a:fillRect/>
+          </a:stretch>
+        </p:blipFill>
+        <p:spPr>
+          <a:xfrm>
+            <a:off x="756518" y="2464385"/>
+            <a:ext cx="4229350" cy="2245401"/>
+          </a:xfrm>
+          <a:prstGeom prst="rect">
+            <a:avLst/>
+          </a:prstGeom>
+        </p:spPr>
+      </p:pic>
+      <p:sp>
+        <p:nvSpPr>
+          <p:cNvPr id="5" name="Oval 4">
+            <a:extLst>
+              <a:ext uri="{FF2B5EF4-FFF2-40B4-BE49-F238E27FC236}">
+                <a16:creationId xmlns:a16="http://schemas.microsoft.com/office/drawing/2014/main" id="{E1176225-977E-4705-A16E-3D23250C18A0}"/>
+              </a:ext>
+            </a:extLst>
+          </p:cNvPr>
+          <p:cNvSpPr/>
+          <p:nvPr/>
+        </p:nvSpPr>
+        <p:spPr>
+          <a:xfrm>
+            <a:off x="5916776" y="2393075"/>
+            <a:ext cx="1676510" cy="727649"/>
+          </a:xfrm>
+          <a:prstGeom prst="ellipse">
+            <a:avLst/>
+          </a:prstGeom>
+          <a:solidFill>
+            <a:srgbClr val="109677"/>
+          </a:solidFill>
+          <a:ln>
+            <a:noFill/>
+          </a:ln>
+        </p:spPr>
+        <p:style>
+          <a:lnRef idx="2">
+            <a:schemeClr val="accent1">
+              <a:shade val="50000"/>
+            </a:schemeClr>
+          </a:lnRef>
+          <a:fillRef idx="1">
+            <a:schemeClr val="accent1"/>
+          </a:fillRef>
+          <a:effectRef idx="0">
+            <a:schemeClr val="accent1"/>
+          </a:effectRef>
+          <a:fontRef idx="minor">
+            <a:schemeClr val="lt1"/>
+          </a:fontRef>
+        </p:style>
+        <p:txBody>
+          <a:bodyPr rtlCol="0" anchor="ctr"/>
+          <a:lstStyle/>
+          <a:p>
+            <a:pPr algn="ctr"/>
+            <a:r>
+              <a:rPr lang="en-US" dirty="0">
+                <a:solidFill>
+                  <a:schemeClr val="tx1"/>
+                </a:solidFill>
+              </a:rPr>
+              <a:t>Associated light name</a:t>
+            </a:r>
+          </a:p>
+        </p:txBody>
+      </p:sp>
+      <p:cxnSp>
+        <p:nvCxnSpPr>
+          <p:cNvPr id="6" name="Straight Arrow Connector 5">
+            <a:extLst>
+              <a:ext uri="{FF2B5EF4-FFF2-40B4-BE49-F238E27FC236}">
+                <a16:creationId xmlns:a16="http://schemas.microsoft.com/office/drawing/2014/main" id="{B0EF3413-E0D6-471C-AA95-8EB5D3BB6999}"/>
+              </a:ext>
+            </a:extLst>
+          </p:cNvPr>
+          <p:cNvCxnSpPr>
+            <a:cxnSpLocks/>
+          </p:cNvCxnSpPr>
+          <p:nvPr/>
+        </p:nvCxnSpPr>
+        <p:spPr>
+          <a:xfrm flipH="1">
+            <a:off x="3223066" y="2756900"/>
+            <a:ext cx="2503842" cy="0"/>
+          </a:xfrm>
+          <a:prstGeom prst="straightConnector1">
+            <a:avLst/>
+          </a:prstGeom>
+          <a:ln w="50800">
+            <a:solidFill>
+              <a:srgbClr val="109677"/>
+            </a:solidFill>
+            <a:tailEnd type="arrow"/>
+          </a:ln>
+        </p:spPr>
+        <p:style>
+          <a:lnRef idx="1">
+            <a:schemeClr val="accent6"/>
+          </a:lnRef>
+          <a:fillRef idx="0">
+            <a:schemeClr val="accent6"/>
+          </a:fillRef>
+          <a:effectRef idx="0">
+            <a:schemeClr val="accent6"/>
+          </a:effectRef>
+          <a:fontRef idx="minor">
+            <a:schemeClr val="tx1"/>
+          </a:fontRef>
+        </p:style>
+      </p:cxnSp>
+      <p:pic>
+        <p:nvPicPr>
+          <p:cNvPr id="8" name="Picture 7">
+            <a:extLst>
+              <a:ext uri="{FF2B5EF4-FFF2-40B4-BE49-F238E27FC236}">
+                <a16:creationId xmlns:a16="http://schemas.microsoft.com/office/drawing/2014/main" id="{14B5489A-A6FF-4EDF-9E22-65AA3D87E3F0}"/>
+              </a:ext>
+            </a:extLst>
+          </p:cNvPr>
+          <p:cNvPicPr>
+            <a:picLocks noChangeAspect="1"/>
+          </p:cNvPicPr>
+          <p:nvPr/>
+        </p:nvPicPr>
+        <p:blipFill>
+          <a:blip r:embed="rId3"/>
+          <a:stretch>
+            <a:fillRect/>
+          </a:stretch>
+        </p:blipFill>
+        <p:spPr>
+          <a:xfrm>
+            <a:off x="5515944" y="4119616"/>
+            <a:ext cx="7381402" cy="1180340"/>
+          </a:xfrm>
+          <a:prstGeom prst="rect">
+            <a:avLst/>
+          </a:prstGeom>
+        </p:spPr>
+      </p:pic>
+      <p:cxnSp>
+        <p:nvCxnSpPr>
+          <p:cNvPr id="9" name="Straight Arrow Connector 8">
+            <a:extLst>
+              <a:ext uri="{FF2B5EF4-FFF2-40B4-BE49-F238E27FC236}">
+                <a16:creationId xmlns:a16="http://schemas.microsoft.com/office/drawing/2014/main" id="{6565CA0A-15E5-4096-931B-2695AD747E96}"/>
+              </a:ext>
+            </a:extLst>
+          </p:cNvPr>
+          <p:cNvCxnSpPr>
+            <a:cxnSpLocks/>
+          </p:cNvCxnSpPr>
+          <p:nvPr/>
+        </p:nvCxnSpPr>
+        <p:spPr>
+          <a:xfrm>
+            <a:off x="4474987" y="3244241"/>
+            <a:ext cx="2865265" cy="688932"/>
+          </a:xfrm>
+          <a:prstGeom prst="straightConnector1">
+            <a:avLst/>
+          </a:prstGeom>
+          <a:ln w="50800">
+            <a:solidFill>
+              <a:srgbClr val="109677"/>
+            </a:solidFill>
+            <a:tailEnd type="arrow"/>
+          </a:ln>
+        </p:spPr>
+        <p:style>
+          <a:lnRef idx="1">
+            <a:schemeClr val="accent6"/>
+          </a:lnRef>
+          <a:fillRef idx="0">
+            <a:schemeClr val="accent6"/>
+          </a:fillRef>
+          <a:effectRef idx="0">
+            <a:schemeClr val="accent6"/>
+          </a:effectRef>
+          <a:fontRef idx="minor">
+            <a:schemeClr val="tx1"/>
+          </a:fontRef>
+        </p:style>
+      </p:cxnSp>
+      <p:cxnSp>
+        <p:nvCxnSpPr>
+          <p:cNvPr id="13" name="Straight Arrow Connector 12">
+            <a:extLst>
+              <a:ext uri="{FF2B5EF4-FFF2-40B4-BE49-F238E27FC236}">
+                <a16:creationId xmlns:a16="http://schemas.microsoft.com/office/drawing/2014/main" id="{90FACD11-F00D-462F-94AA-01E159BEEBDB}"/>
+              </a:ext>
+            </a:extLst>
+          </p:cNvPr>
+          <p:cNvCxnSpPr>
+            <a:cxnSpLocks/>
+          </p:cNvCxnSpPr>
+          <p:nvPr/>
+        </p:nvCxnSpPr>
+        <p:spPr>
+          <a:xfrm>
+            <a:off x="1877326" y="3933173"/>
+            <a:ext cx="1" cy="1250273"/>
+          </a:xfrm>
+          <a:prstGeom prst="straightConnector1">
+            <a:avLst/>
+          </a:prstGeom>
+          <a:ln w="50800">
+            <a:solidFill>
+              <a:srgbClr val="109677"/>
+            </a:solidFill>
+            <a:tailEnd type="arrow"/>
+          </a:ln>
+        </p:spPr>
+        <p:style>
+          <a:lnRef idx="1">
+            <a:schemeClr val="accent6"/>
+          </a:lnRef>
+          <a:fillRef idx="0">
+            <a:schemeClr val="accent6"/>
+          </a:fillRef>
+          <a:effectRef idx="0">
+            <a:schemeClr val="accent6"/>
+          </a:effectRef>
+          <a:fontRef idx="minor">
+            <a:schemeClr val="tx1"/>
+          </a:fontRef>
+        </p:style>
+      </p:cxnSp>
+      <p:sp>
+        <p:nvSpPr>
+          <p:cNvPr id="15" name="Oval 14">
+            <a:extLst>
+              <a:ext uri="{FF2B5EF4-FFF2-40B4-BE49-F238E27FC236}">
+                <a16:creationId xmlns:a16="http://schemas.microsoft.com/office/drawing/2014/main" id="{37D7CE0F-558E-42EB-A171-EFCEE5DE24EB}"/>
+              </a:ext>
+            </a:extLst>
+          </p:cNvPr>
+          <p:cNvSpPr/>
+          <p:nvPr/>
+        </p:nvSpPr>
+        <p:spPr>
+          <a:xfrm>
+            <a:off x="1039071" y="5247523"/>
+            <a:ext cx="1676510" cy="727649"/>
+          </a:xfrm>
+          <a:prstGeom prst="ellipse">
+            <a:avLst/>
+          </a:prstGeom>
+          <a:solidFill>
+            <a:srgbClr val="109677"/>
+          </a:solidFill>
+          <a:ln>
+            <a:noFill/>
+          </a:ln>
+        </p:spPr>
+        <p:style>
+          <a:lnRef idx="2">
+            <a:schemeClr val="accent1">
+              <a:shade val="50000"/>
+            </a:schemeClr>
+          </a:lnRef>
+          <a:fillRef idx="1">
+            <a:schemeClr val="accent1"/>
+          </a:fillRef>
+          <a:effectRef idx="0">
+            <a:schemeClr val="accent1"/>
+          </a:effectRef>
+          <a:fontRef idx="minor">
+            <a:schemeClr val="lt1"/>
+          </a:fontRef>
+        </p:style>
+        <p:txBody>
+          <a:bodyPr rtlCol="0" anchor="ctr"/>
+          <a:lstStyle/>
+          <a:p>
+            <a:pPr algn="ctr"/>
+            <a:r>
+              <a:rPr lang="en-US" dirty="0">
+                <a:solidFill>
+                  <a:schemeClr val="tx1"/>
+                </a:solidFill>
+              </a:rPr>
+              <a:t>Child</a:t>
+            </a:r>
+          </a:p>
+        </p:txBody>
+      </p:sp>
+    </p:spTree>
+    <p:extLst>
+      <p:ext uri="{BB962C8B-B14F-4D97-AF65-F5344CB8AC3E}">
+        <p14:creationId xmlns:p14="http://schemas.microsoft.com/office/powerpoint/2010/main" val="823894437"/>
       </p:ext>
     </p:extLst>
   </p:cSld>

</xml_diff>